<commit_message>
apresentação com o que temos certo até o momento
</commit_message>
<xml_diff>
--- a/doc/apresentacao_entrega_2/slides_apresentacao_2.pptx
+++ b/doc/apresentacao_entrega_2/slides_apresentacao_2.pptx
@@ -10,12 +10,19 @@
     <p:sldId id="258" r:id="rId4"/>
     <p:sldId id="259" r:id="rId5"/>
     <p:sldId id="261" r:id="rId6"/>
-    <p:sldId id="264" r:id="rId7"/>
-    <p:sldId id="260" r:id="rId8"/>
-    <p:sldId id="263" r:id="rId9"/>
-    <p:sldId id="265" r:id="rId10"/>
-    <p:sldId id="262" r:id="rId11"/>
-    <p:sldId id="266" r:id="rId12"/>
+    <p:sldId id="267" r:id="rId7"/>
+    <p:sldId id="268" r:id="rId8"/>
+    <p:sldId id="269" r:id="rId9"/>
+    <p:sldId id="270" r:id="rId10"/>
+    <p:sldId id="271" r:id="rId11"/>
+    <p:sldId id="264" r:id="rId12"/>
+    <p:sldId id="260" r:id="rId13"/>
+    <p:sldId id="272" r:id="rId14"/>
+    <p:sldId id="273" r:id="rId15"/>
+    <p:sldId id="263" r:id="rId16"/>
+    <p:sldId id="265" r:id="rId17"/>
+    <p:sldId id="262" r:id="rId18"/>
+    <p:sldId id="266" r:id="rId19"/>
   </p:sldIdLst>
   <p:sldSz cx="12192000" cy="6858000"/>
   <p:notesSz cx="6858000" cy="9144000"/>
@@ -269,7 +276,7 @@
           <a:p>
             <a:fld id="{7D788219-CB4A-4D6F-8184-B20BCBA65B7F}" type="datetimeFigureOut">
               <a:rPr lang="pt-BR" smtClean="0"/>
-              <a:t>07/10/2020</a:t>
+              <a:t>13/10/2020</a:t>
             </a:fld>
             <a:endParaRPr lang="pt-BR"/>
           </a:p>
@@ -467,7 +474,7 @@
           <a:p>
             <a:fld id="{7D788219-CB4A-4D6F-8184-B20BCBA65B7F}" type="datetimeFigureOut">
               <a:rPr lang="pt-BR" smtClean="0"/>
-              <a:t>07/10/2020</a:t>
+              <a:t>13/10/2020</a:t>
             </a:fld>
             <a:endParaRPr lang="pt-BR"/>
           </a:p>
@@ -675,7 +682,7 @@
           <a:p>
             <a:fld id="{7D788219-CB4A-4D6F-8184-B20BCBA65B7F}" type="datetimeFigureOut">
               <a:rPr lang="pt-BR" smtClean="0"/>
-              <a:t>07/10/2020</a:t>
+              <a:t>13/10/2020</a:t>
             </a:fld>
             <a:endParaRPr lang="pt-BR"/>
           </a:p>
@@ -873,7 +880,7 @@
           <a:p>
             <a:fld id="{7D788219-CB4A-4D6F-8184-B20BCBA65B7F}" type="datetimeFigureOut">
               <a:rPr lang="pt-BR" smtClean="0"/>
-              <a:t>07/10/2020</a:t>
+              <a:t>13/10/2020</a:t>
             </a:fld>
             <a:endParaRPr lang="pt-BR"/>
           </a:p>
@@ -1148,7 +1155,7 @@
           <a:p>
             <a:fld id="{7D788219-CB4A-4D6F-8184-B20BCBA65B7F}" type="datetimeFigureOut">
               <a:rPr lang="pt-BR" smtClean="0"/>
-              <a:t>07/10/2020</a:t>
+              <a:t>13/10/2020</a:t>
             </a:fld>
             <a:endParaRPr lang="pt-BR"/>
           </a:p>
@@ -1413,7 +1420,7 @@
           <a:p>
             <a:fld id="{7D788219-CB4A-4D6F-8184-B20BCBA65B7F}" type="datetimeFigureOut">
               <a:rPr lang="pt-BR" smtClean="0"/>
-              <a:t>07/10/2020</a:t>
+              <a:t>13/10/2020</a:t>
             </a:fld>
             <a:endParaRPr lang="pt-BR"/>
           </a:p>
@@ -1825,7 +1832,7 @@
           <a:p>
             <a:fld id="{7D788219-CB4A-4D6F-8184-B20BCBA65B7F}" type="datetimeFigureOut">
               <a:rPr lang="pt-BR" smtClean="0"/>
-              <a:t>07/10/2020</a:t>
+              <a:t>13/10/2020</a:t>
             </a:fld>
             <a:endParaRPr lang="pt-BR"/>
           </a:p>
@@ -1966,7 +1973,7 @@
           <a:p>
             <a:fld id="{7D788219-CB4A-4D6F-8184-B20BCBA65B7F}" type="datetimeFigureOut">
               <a:rPr lang="pt-BR" smtClean="0"/>
-              <a:t>07/10/2020</a:t>
+              <a:t>13/10/2020</a:t>
             </a:fld>
             <a:endParaRPr lang="pt-BR"/>
           </a:p>
@@ -2079,7 +2086,7 @@
           <a:p>
             <a:fld id="{7D788219-CB4A-4D6F-8184-B20BCBA65B7F}" type="datetimeFigureOut">
               <a:rPr lang="pt-BR" smtClean="0"/>
-              <a:t>07/10/2020</a:t>
+              <a:t>13/10/2020</a:t>
             </a:fld>
             <a:endParaRPr lang="pt-BR"/>
           </a:p>
@@ -2390,7 +2397,7 @@
           <a:p>
             <a:fld id="{7D788219-CB4A-4D6F-8184-B20BCBA65B7F}" type="datetimeFigureOut">
               <a:rPr lang="pt-BR" smtClean="0"/>
-              <a:t>07/10/2020</a:t>
+              <a:t>13/10/2020</a:t>
             </a:fld>
             <a:endParaRPr lang="pt-BR"/>
           </a:p>
@@ -2678,7 +2685,7 @@
           <a:p>
             <a:fld id="{7D788219-CB4A-4D6F-8184-B20BCBA65B7F}" type="datetimeFigureOut">
               <a:rPr lang="pt-BR" smtClean="0"/>
-              <a:t>07/10/2020</a:t>
+              <a:t>13/10/2020</a:t>
             </a:fld>
             <a:endParaRPr lang="pt-BR"/>
           </a:p>
@@ -2919,7 +2926,7 @@
           <a:p>
             <a:fld id="{7D788219-CB4A-4D6F-8184-B20BCBA65B7F}" type="datetimeFigureOut">
               <a:rPr lang="pt-BR" smtClean="0"/>
-              <a:t>07/10/2020</a:t>
+              <a:t>13/10/2020</a:t>
             </a:fld>
             <a:endParaRPr lang="pt-BR"/>
           </a:p>
@@ -3440,7 +3447,7 @@
         <p:spPr>
           <a:xfrm>
             <a:off x="0" y="0"/>
-            <a:ext cx="2060713" cy="1655762"/>
+            <a:ext cx="1088555" cy="874643"/>
           </a:xfrm>
           <a:prstGeom prst="rect">
             <a:avLst/>
@@ -3541,6 +3548,729 @@
           <a:chExt cx="0" cy="0"/>
         </a:xfrm>
       </p:grpSpPr>
+      <p:pic>
+        <p:nvPicPr>
+          <p:cNvPr id="4" name="Imagem 3" descr="Diagrama, Desenho técnico&#10;&#10;Descrição gerada automaticamente">
+            <a:extLst>
+              <a:ext uri="{FF2B5EF4-FFF2-40B4-BE49-F238E27FC236}">
+                <a16:creationId xmlns:a16="http://schemas.microsoft.com/office/drawing/2014/main" id="{6B44BAF2-96CD-4EC6-BBBC-E9F2AB3496B4}"/>
+              </a:ext>
+            </a:extLst>
+          </p:cNvPr>
+          <p:cNvPicPr>
+            <a:picLocks noChangeAspect="1"/>
+          </p:cNvPicPr>
+          <p:nvPr/>
+        </p:nvPicPr>
+        <p:blipFill>
+          <a:blip r:embed="rId2">
+            <a:extLst>
+              <a:ext uri="{28A0092B-C50C-407E-A947-70E740481C1C}">
+                <a14:useLocalDpi xmlns:a14="http://schemas.microsoft.com/office/drawing/2010/main" val="0"/>
+              </a:ext>
+            </a:extLst>
+          </a:blip>
+          <a:stretch>
+            <a:fillRect/>
+          </a:stretch>
+        </p:blipFill>
+        <p:spPr>
+          <a:xfrm>
+            <a:off x="2911202" y="0"/>
+            <a:ext cx="6369596" cy="6858000"/>
+          </a:xfrm>
+          <a:prstGeom prst="rect">
+            <a:avLst/>
+          </a:prstGeom>
+        </p:spPr>
+      </p:pic>
+    </p:spTree>
+    <p:extLst>
+      <p:ext uri="{BB962C8B-B14F-4D97-AF65-F5344CB8AC3E}">
+        <p14:creationId xmlns:p14="http://schemas.microsoft.com/office/powerpoint/2010/main" val="1135287093"/>
+      </p:ext>
+    </p:extLst>
+  </p:cSld>
+  <p:clrMapOvr>
+    <a:masterClrMapping/>
+  </p:clrMapOvr>
+</p:sld>
+</file>
+
+<file path=ppt/slides/slide11.xml><?xml version="1.0" encoding="utf-8"?>
+<p:sld xmlns:a="http://schemas.openxmlformats.org/drawingml/2006/main" xmlns:r="http://schemas.openxmlformats.org/officeDocument/2006/relationships" xmlns:p="http://schemas.openxmlformats.org/presentationml/2006/main">
+  <p:cSld>
+    <p:bg>
+      <p:bgPr>
+        <a:solidFill>
+          <a:srgbClr val="B1E0ED"/>
+        </a:solidFill>
+        <a:effectLst/>
+      </p:bgPr>
+    </p:bg>
+    <p:spTree>
+      <p:nvGrpSpPr>
+        <p:cNvPr id="1" name=""/>
+        <p:cNvGrpSpPr/>
+        <p:nvPr/>
+      </p:nvGrpSpPr>
+      <p:grpSpPr>
+        <a:xfrm>
+          <a:off x="0" y="0"/>
+          <a:ext cx="0" cy="0"/>
+          <a:chOff x="0" y="0"/>
+          <a:chExt cx="0" cy="0"/>
+        </a:xfrm>
+      </p:grpSpPr>
+      <p:sp>
+        <p:nvSpPr>
+          <p:cNvPr id="2" name="Título 1">
+            <a:extLst>
+              <a:ext uri="{FF2B5EF4-FFF2-40B4-BE49-F238E27FC236}">
+                <a16:creationId xmlns:a16="http://schemas.microsoft.com/office/drawing/2014/main" id="{2DD7BC93-A7C1-4D1E-A4D7-13CA29EA4F30}"/>
+              </a:ext>
+            </a:extLst>
+          </p:cNvPr>
+          <p:cNvSpPr>
+            <a:spLocks noGrp="1"/>
+          </p:cNvSpPr>
+          <p:nvPr>
+            <p:ph type="title"/>
+          </p:nvPr>
+        </p:nvSpPr>
+        <p:spPr/>
+        <p:txBody>
+          <a:bodyPr/>
+          <a:lstStyle/>
+          <a:p>
+            <a:r>
+              <a:rPr lang="pt-BR" dirty="0" err="1">
+                <a:solidFill>
+                  <a:srgbClr val="003B4C"/>
+                </a:solidFill>
+                <a:latin typeface="Aharoni" panose="02010803020104030203" pitchFamily="2" charset="-79"/>
+                <a:cs typeface="Aharoni" panose="02010803020104030203" pitchFamily="2" charset="-79"/>
+              </a:rPr>
+              <a:t>RoadTracker</a:t>
+            </a:r>
+            <a:endParaRPr lang="pt-BR" dirty="0">
+              <a:solidFill>
+                <a:srgbClr val="003B4C"/>
+              </a:solidFill>
+              <a:latin typeface="Aharoni" panose="02010803020104030203" pitchFamily="2" charset="-79"/>
+              <a:cs typeface="Aharoni" panose="02010803020104030203" pitchFamily="2" charset="-79"/>
+            </a:endParaRPr>
+          </a:p>
+        </p:txBody>
+      </p:sp>
+      <p:sp>
+        <p:nvSpPr>
+          <p:cNvPr id="3" name="Espaço Reservado para Texto 2">
+            <a:extLst>
+              <a:ext uri="{FF2B5EF4-FFF2-40B4-BE49-F238E27FC236}">
+                <a16:creationId xmlns:a16="http://schemas.microsoft.com/office/drawing/2014/main" id="{72908049-A6C0-4B7F-A845-BA297829D8A2}"/>
+              </a:ext>
+            </a:extLst>
+          </p:cNvPr>
+          <p:cNvSpPr>
+            <a:spLocks noGrp="1"/>
+          </p:cNvSpPr>
+          <p:nvPr>
+            <p:ph type="body" idx="1"/>
+          </p:nvPr>
+        </p:nvSpPr>
+        <p:spPr/>
+        <p:txBody>
+          <a:bodyPr/>
+          <a:lstStyle/>
+          <a:p>
+            <a:r>
+              <a:rPr lang="pt-BR" dirty="0">
+                <a:solidFill>
+                  <a:srgbClr val="003B4C"/>
+                </a:solidFill>
+                <a:latin typeface="Aharoni" panose="02010803020104030203" pitchFamily="2" charset="-79"/>
+                <a:cs typeface="Aharoni" panose="02010803020104030203" pitchFamily="2" charset="-79"/>
+              </a:rPr>
+              <a:t>O nosso sistema</a:t>
+            </a:r>
+          </a:p>
+        </p:txBody>
+      </p:sp>
+    </p:spTree>
+    <p:extLst>
+      <p:ext uri="{BB962C8B-B14F-4D97-AF65-F5344CB8AC3E}">
+        <p14:creationId xmlns:p14="http://schemas.microsoft.com/office/powerpoint/2010/main" val="3245720063"/>
+      </p:ext>
+    </p:extLst>
+  </p:cSld>
+  <p:clrMapOvr>
+    <a:masterClrMapping/>
+  </p:clrMapOvr>
+</p:sld>
+</file>
+
+<file path=ppt/slides/slide12.xml><?xml version="1.0" encoding="utf-8"?>
+<p:sld xmlns:a="http://schemas.openxmlformats.org/drawingml/2006/main" xmlns:r="http://schemas.openxmlformats.org/officeDocument/2006/relationships" xmlns:p="http://schemas.openxmlformats.org/presentationml/2006/main">
+  <p:cSld>
+    <p:bg>
+      <p:bgPr>
+        <a:solidFill>
+          <a:srgbClr val="B1E0ED"/>
+        </a:solidFill>
+        <a:effectLst/>
+      </p:bgPr>
+    </p:bg>
+    <p:spTree>
+      <p:nvGrpSpPr>
+        <p:cNvPr id="1" name=""/>
+        <p:cNvGrpSpPr/>
+        <p:nvPr/>
+      </p:nvGrpSpPr>
+      <p:grpSpPr>
+        <a:xfrm>
+          <a:off x="0" y="0"/>
+          <a:ext cx="0" cy="0"/>
+          <a:chOff x="0" y="0"/>
+          <a:chExt cx="0" cy="0"/>
+        </a:xfrm>
+      </p:grpSpPr>
+      <p:sp>
+        <p:nvSpPr>
+          <p:cNvPr id="2" name="Título 1">
+            <a:extLst>
+              <a:ext uri="{FF2B5EF4-FFF2-40B4-BE49-F238E27FC236}">
+                <a16:creationId xmlns:a16="http://schemas.microsoft.com/office/drawing/2014/main" id="{2DD7BC93-A7C1-4D1E-A4D7-13CA29EA4F30}"/>
+              </a:ext>
+            </a:extLst>
+          </p:cNvPr>
+          <p:cNvSpPr>
+            <a:spLocks noGrp="1"/>
+          </p:cNvSpPr>
+          <p:nvPr>
+            <p:ph type="title"/>
+          </p:nvPr>
+        </p:nvSpPr>
+        <p:spPr/>
+        <p:txBody>
+          <a:bodyPr/>
+          <a:lstStyle/>
+          <a:p>
+            <a:r>
+              <a:rPr lang="pt-BR" dirty="0">
+                <a:solidFill>
+                  <a:srgbClr val="003B4C"/>
+                </a:solidFill>
+                <a:latin typeface="Aharoni" panose="02010803020104030203" pitchFamily="2" charset="-79"/>
+                <a:cs typeface="Aharoni" panose="02010803020104030203" pitchFamily="2" charset="-79"/>
+              </a:rPr>
+              <a:t>Segunda entrega</a:t>
+            </a:r>
+          </a:p>
+        </p:txBody>
+      </p:sp>
+      <p:sp>
+        <p:nvSpPr>
+          <p:cNvPr id="3" name="Espaço Reservado para Texto 2">
+            <a:extLst>
+              <a:ext uri="{FF2B5EF4-FFF2-40B4-BE49-F238E27FC236}">
+                <a16:creationId xmlns:a16="http://schemas.microsoft.com/office/drawing/2014/main" id="{72908049-A6C0-4B7F-A845-BA297829D8A2}"/>
+              </a:ext>
+            </a:extLst>
+          </p:cNvPr>
+          <p:cNvSpPr>
+            <a:spLocks noGrp="1"/>
+          </p:cNvSpPr>
+          <p:nvPr>
+            <p:ph type="body" idx="1"/>
+          </p:nvPr>
+        </p:nvSpPr>
+        <p:spPr/>
+        <p:txBody>
+          <a:bodyPr/>
+          <a:lstStyle/>
+          <a:p>
+            <a:r>
+              <a:rPr lang="pt-BR" dirty="0">
+                <a:solidFill>
+                  <a:srgbClr val="003B4C"/>
+                </a:solidFill>
+                <a:latin typeface="Aharoni" panose="02010803020104030203" pitchFamily="2" charset="-79"/>
+                <a:cs typeface="Aharoni" panose="02010803020104030203" pitchFamily="2" charset="-79"/>
+              </a:rPr>
+              <a:t>O que iremos entregar</a:t>
+            </a:r>
+          </a:p>
+        </p:txBody>
+      </p:sp>
+    </p:spTree>
+    <p:extLst>
+      <p:ext uri="{BB962C8B-B14F-4D97-AF65-F5344CB8AC3E}">
+        <p14:creationId xmlns:p14="http://schemas.microsoft.com/office/powerpoint/2010/main" val="806626883"/>
+      </p:ext>
+    </p:extLst>
+  </p:cSld>
+  <p:clrMapOvr>
+    <a:masterClrMapping/>
+  </p:clrMapOvr>
+</p:sld>
+</file>
+
+<file path=ppt/slides/slide13.xml><?xml version="1.0" encoding="utf-8"?>
+<p:sld xmlns:a="http://schemas.openxmlformats.org/drawingml/2006/main" xmlns:r="http://schemas.openxmlformats.org/officeDocument/2006/relationships" xmlns:p="http://schemas.openxmlformats.org/presentationml/2006/main">
+  <p:cSld>
+    <p:bg>
+      <p:bgPr>
+        <a:solidFill>
+          <a:srgbClr val="B1E0ED"/>
+        </a:solidFill>
+        <a:effectLst/>
+      </p:bgPr>
+    </p:bg>
+    <p:spTree>
+      <p:nvGrpSpPr>
+        <p:cNvPr id="1" name=""/>
+        <p:cNvGrpSpPr/>
+        <p:nvPr/>
+      </p:nvGrpSpPr>
+      <p:grpSpPr>
+        <a:xfrm>
+          <a:off x="0" y="0"/>
+          <a:ext cx="0" cy="0"/>
+          <a:chOff x="0" y="0"/>
+          <a:chExt cx="0" cy="0"/>
+        </a:xfrm>
+      </p:grpSpPr>
+      <p:pic>
+        <p:nvPicPr>
+          <p:cNvPr id="3" name="Imagem 2" descr="Diagrama&#10;&#10;Descrição gerada automaticamente">
+            <a:extLst>
+              <a:ext uri="{FF2B5EF4-FFF2-40B4-BE49-F238E27FC236}">
+                <a16:creationId xmlns:a16="http://schemas.microsoft.com/office/drawing/2014/main" id="{EF9EFE96-9AAA-4898-83E2-CBFB7560A12A}"/>
+              </a:ext>
+            </a:extLst>
+          </p:cNvPr>
+          <p:cNvPicPr>
+            <a:picLocks noChangeAspect="1"/>
+          </p:cNvPicPr>
+          <p:nvPr/>
+        </p:nvPicPr>
+        <p:blipFill rotWithShape="1">
+          <a:blip r:embed="rId2">
+            <a:extLst>
+              <a:ext uri="{28A0092B-C50C-407E-A947-70E740481C1C}">
+                <a14:useLocalDpi xmlns:a14="http://schemas.microsoft.com/office/drawing/2010/main" val="0"/>
+              </a:ext>
+            </a:extLst>
+          </a:blip>
+          <a:srcRect b="48406"/>
+          <a:stretch/>
+        </p:blipFill>
+        <p:spPr>
+          <a:xfrm>
+            <a:off x="1397846" y="0"/>
+            <a:ext cx="9396307" cy="6858000"/>
+          </a:xfrm>
+          <a:prstGeom prst="rect">
+            <a:avLst/>
+          </a:prstGeom>
+        </p:spPr>
+      </p:pic>
+    </p:spTree>
+    <p:extLst>
+      <p:ext uri="{BB962C8B-B14F-4D97-AF65-F5344CB8AC3E}">
+        <p14:creationId xmlns:p14="http://schemas.microsoft.com/office/powerpoint/2010/main" val="4206663311"/>
+      </p:ext>
+    </p:extLst>
+  </p:cSld>
+  <p:clrMapOvr>
+    <a:masterClrMapping/>
+  </p:clrMapOvr>
+</p:sld>
+</file>
+
+<file path=ppt/slides/slide14.xml><?xml version="1.0" encoding="utf-8"?>
+<p:sld xmlns:a="http://schemas.openxmlformats.org/drawingml/2006/main" xmlns:r="http://schemas.openxmlformats.org/officeDocument/2006/relationships" xmlns:p="http://schemas.openxmlformats.org/presentationml/2006/main">
+  <p:cSld>
+    <p:bg>
+      <p:bgPr>
+        <a:solidFill>
+          <a:srgbClr val="B1E0ED"/>
+        </a:solidFill>
+        <a:effectLst/>
+      </p:bgPr>
+    </p:bg>
+    <p:spTree>
+      <p:nvGrpSpPr>
+        <p:cNvPr id="1" name=""/>
+        <p:cNvGrpSpPr/>
+        <p:nvPr/>
+      </p:nvGrpSpPr>
+      <p:grpSpPr>
+        <a:xfrm>
+          <a:off x="0" y="0"/>
+          <a:ext cx="0" cy="0"/>
+          <a:chOff x="0" y="0"/>
+          <a:chExt cx="0" cy="0"/>
+        </a:xfrm>
+      </p:grpSpPr>
+      <p:pic>
+        <p:nvPicPr>
+          <p:cNvPr id="4" name="Imagem 3" descr="Diagrama&#10;&#10;Descrição gerada automaticamente">
+            <a:extLst>
+              <a:ext uri="{FF2B5EF4-FFF2-40B4-BE49-F238E27FC236}">
+                <a16:creationId xmlns:a16="http://schemas.microsoft.com/office/drawing/2014/main" id="{2707B5BD-0405-43DF-80B8-770FA9821749}"/>
+              </a:ext>
+            </a:extLst>
+          </p:cNvPr>
+          <p:cNvPicPr>
+            <a:picLocks noChangeAspect="1"/>
+          </p:cNvPicPr>
+          <p:nvPr/>
+        </p:nvPicPr>
+        <p:blipFill rotWithShape="1">
+          <a:blip r:embed="rId2">
+            <a:extLst>
+              <a:ext uri="{28A0092B-C50C-407E-A947-70E740481C1C}">
+                <a14:useLocalDpi xmlns:a14="http://schemas.microsoft.com/office/drawing/2010/main" val="0"/>
+              </a:ext>
+            </a:extLst>
+          </a:blip>
+          <a:srcRect t="52104" b="3996"/>
+          <a:stretch/>
+        </p:blipFill>
+        <p:spPr>
+          <a:xfrm>
+            <a:off x="2565417" y="0"/>
+            <a:ext cx="7061166" cy="4385206"/>
+          </a:xfrm>
+          <a:prstGeom prst="rect">
+            <a:avLst/>
+          </a:prstGeom>
+        </p:spPr>
+      </p:pic>
+      <p:pic>
+        <p:nvPicPr>
+          <p:cNvPr id="6" name="Imagem 5" descr="Uma imagem contendo Diagrama&#10;&#10;Descrição gerada automaticamente">
+            <a:extLst>
+              <a:ext uri="{FF2B5EF4-FFF2-40B4-BE49-F238E27FC236}">
+                <a16:creationId xmlns:a16="http://schemas.microsoft.com/office/drawing/2014/main" id="{9B0FE13D-8A68-43B3-8C0E-254A4127792F}"/>
+              </a:ext>
+            </a:extLst>
+          </p:cNvPr>
+          <p:cNvPicPr>
+            <a:picLocks noChangeAspect="1"/>
+          </p:cNvPicPr>
+          <p:nvPr/>
+        </p:nvPicPr>
+        <p:blipFill rotWithShape="1">
+          <a:blip r:embed="rId3">
+            <a:extLst>
+              <a:ext uri="{28A0092B-C50C-407E-A947-70E740481C1C}">
+                <a14:useLocalDpi xmlns:a14="http://schemas.microsoft.com/office/drawing/2010/main" val="0"/>
+              </a:ext>
+            </a:extLst>
+          </a:blip>
+          <a:srcRect r="1325"/>
+          <a:stretch/>
+        </p:blipFill>
+        <p:spPr>
+          <a:xfrm>
+            <a:off x="2565418" y="4385206"/>
+            <a:ext cx="7061166" cy="2472794"/>
+          </a:xfrm>
+          <a:prstGeom prst="rect">
+            <a:avLst/>
+          </a:prstGeom>
+        </p:spPr>
+      </p:pic>
+    </p:spTree>
+    <p:extLst>
+      <p:ext uri="{BB962C8B-B14F-4D97-AF65-F5344CB8AC3E}">
+        <p14:creationId xmlns:p14="http://schemas.microsoft.com/office/powerpoint/2010/main" val="1179493095"/>
+      </p:ext>
+    </p:extLst>
+  </p:cSld>
+  <p:clrMapOvr>
+    <a:masterClrMapping/>
+  </p:clrMapOvr>
+</p:sld>
+</file>
+
+<file path=ppt/slides/slide15.xml><?xml version="1.0" encoding="utf-8"?>
+<p:sld xmlns:a="http://schemas.openxmlformats.org/drawingml/2006/main" xmlns:r="http://schemas.openxmlformats.org/officeDocument/2006/relationships" xmlns:p="http://schemas.openxmlformats.org/presentationml/2006/main">
+  <p:cSld>
+    <p:bg>
+      <p:bgPr>
+        <a:solidFill>
+          <a:srgbClr val="B1E0ED"/>
+        </a:solidFill>
+        <a:effectLst/>
+      </p:bgPr>
+    </p:bg>
+    <p:spTree>
+      <p:nvGrpSpPr>
+        <p:cNvPr id="1" name=""/>
+        <p:cNvGrpSpPr/>
+        <p:nvPr/>
+      </p:nvGrpSpPr>
+      <p:grpSpPr>
+        <a:xfrm>
+          <a:off x="0" y="0"/>
+          <a:ext cx="0" cy="0"/>
+          <a:chOff x="0" y="0"/>
+          <a:chExt cx="0" cy="0"/>
+        </a:xfrm>
+      </p:grpSpPr>
+      <p:sp>
+        <p:nvSpPr>
+          <p:cNvPr id="2" name="Título 1">
+            <a:extLst>
+              <a:ext uri="{FF2B5EF4-FFF2-40B4-BE49-F238E27FC236}">
+                <a16:creationId xmlns:a16="http://schemas.microsoft.com/office/drawing/2014/main" id="{2DD7BC93-A7C1-4D1E-A4D7-13CA29EA4F30}"/>
+              </a:ext>
+            </a:extLst>
+          </p:cNvPr>
+          <p:cNvSpPr>
+            <a:spLocks noGrp="1"/>
+          </p:cNvSpPr>
+          <p:nvPr>
+            <p:ph type="title"/>
+          </p:nvPr>
+        </p:nvSpPr>
+        <p:spPr/>
+        <p:txBody>
+          <a:bodyPr/>
+          <a:lstStyle/>
+          <a:p>
+            <a:r>
+              <a:rPr lang="pt-BR" dirty="0">
+                <a:solidFill>
+                  <a:srgbClr val="003B4C"/>
+                </a:solidFill>
+                <a:latin typeface="Aharoni" panose="02010803020104030203" pitchFamily="2" charset="-79"/>
+                <a:cs typeface="Aharoni" panose="02010803020104030203" pitchFamily="2" charset="-79"/>
+              </a:rPr>
+              <a:t>Banco de dados</a:t>
+            </a:r>
+          </a:p>
+        </p:txBody>
+      </p:sp>
+      <p:sp>
+        <p:nvSpPr>
+          <p:cNvPr id="3" name="Espaço Reservado para Texto 2">
+            <a:extLst>
+              <a:ext uri="{FF2B5EF4-FFF2-40B4-BE49-F238E27FC236}">
+                <a16:creationId xmlns:a16="http://schemas.microsoft.com/office/drawing/2014/main" id="{72908049-A6C0-4B7F-A845-BA297829D8A2}"/>
+              </a:ext>
+            </a:extLst>
+          </p:cNvPr>
+          <p:cNvSpPr>
+            <a:spLocks noGrp="1"/>
+          </p:cNvSpPr>
+          <p:nvPr>
+            <p:ph type="body" idx="1"/>
+          </p:nvPr>
+        </p:nvSpPr>
+        <p:spPr/>
+        <p:txBody>
+          <a:bodyPr/>
+          <a:lstStyle/>
+          <a:p>
+            <a:r>
+              <a:rPr lang="pt-BR" dirty="0">
+                <a:solidFill>
+                  <a:srgbClr val="003B4C"/>
+                </a:solidFill>
+                <a:latin typeface="Aharoni" panose="02010803020104030203" pitchFamily="2" charset="-79"/>
+                <a:cs typeface="Aharoni" panose="02010803020104030203" pitchFamily="2" charset="-79"/>
+              </a:rPr>
+              <a:t>Disposição dos dados do </a:t>
+            </a:r>
+            <a:r>
+              <a:rPr lang="pt-BR" dirty="0" err="1">
+                <a:solidFill>
+                  <a:srgbClr val="003B4C"/>
+                </a:solidFill>
+                <a:latin typeface="Aharoni" panose="02010803020104030203" pitchFamily="2" charset="-79"/>
+                <a:cs typeface="Aharoni" panose="02010803020104030203" pitchFamily="2" charset="-79"/>
+              </a:rPr>
+              <a:t>RoadTracker</a:t>
+            </a:r>
+            <a:endParaRPr lang="pt-BR" dirty="0">
+              <a:solidFill>
+                <a:srgbClr val="003B4C"/>
+              </a:solidFill>
+              <a:latin typeface="Aharoni" panose="02010803020104030203" pitchFamily="2" charset="-79"/>
+              <a:cs typeface="Aharoni" panose="02010803020104030203" pitchFamily="2" charset="-79"/>
+            </a:endParaRPr>
+          </a:p>
+        </p:txBody>
+      </p:sp>
+    </p:spTree>
+    <p:extLst>
+      <p:ext uri="{BB962C8B-B14F-4D97-AF65-F5344CB8AC3E}">
+        <p14:creationId xmlns:p14="http://schemas.microsoft.com/office/powerpoint/2010/main" val="1127846638"/>
+      </p:ext>
+    </p:extLst>
+  </p:cSld>
+  <p:clrMapOvr>
+    <a:masterClrMapping/>
+  </p:clrMapOvr>
+</p:sld>
+</file>
+
+<file path=ppt/slides/slide16.xml><?xml version="1.0" encoding="utf-8"?>
+<p:sld xmlns:a="http://schemas.openxmlformats.org/drawingml/2006/main" xmlns:r="http://schemas.openxmlformats.org/officeDocument/2006/relationships" xmlns:p="http://schemas.openxmlformats.org/presentationml/2006/main">
+  <p:cSld>
+    <p:bg>
+      <p:bgPr>
+        <a:solidFill>
+          <a:srgbClr val="B1E0ED"/>
+        </a:solidFill>
+        <a:effectLst/>
+      </p:bgPr>
+    </p:bg>
+    <p:spTree>
+      <p:nvGrpSpPr>
+        <p:cNvPr id="1" name=""/>
+        <p:cNvGrpSpPr/>
+        <p:nvPr/>
+      </p:nvGrpSpPr>
+      <p:grpSpPr>
+        <a:xfrm>
+          <a:off x="0" y="0"/>
+          <a:ext cx="0" cy="0"/>
+          <a:chOff x="0" y="0"/>
+          <a:chExt cx="0" cy="0"/>
+        </a:xfrm>
+      </p:grpSpPr>
+      <p:sp>
+        <p:nvSpPr>
+          <p:cNvPr id="2" name="Título 1">
+            <a:extLst>
+              <a:ext uri="{FF2B5EF4-FFF2-40B4-BE49-F238E27FC236}">
+                <a16:creationId xmlns:a16="http://schemas.microsoft.com/office/drawing/2014/main" id="{2DD7BC93-A7C1-4D1E-A4D7-13CA29EA4F30}"/>
+              </a:ext>
+            </a:extLst>
+          </p:cNvPr>
+          <p:cNvSpPr>
+            <a:spLocks noGrp="1"/>
+          </p:cNvSpPr>
+          <p:nvPr>
+            <p:ph type="title"/>
+          </p:nvPr>
+        </p:nvSpPr>
+        <p:spPr/>
+        <p:txBody>
+          <a:bodyPr/>
+          <a:lstStyle/>
+          <a:p>
+            <a:r>
+              <a:rPr lang="pt-BR" dirty="0">
+                <a:solidFill>
+                  <a:srgbClr val="003B4C"/>
+                </a:solidFill>
+                <a:latin typeface="Aharoni" panose="02010803020104030203" pitchFamily="2" charset="-79"/>
+                <a:cs typeface="Aharoni" panose="02010803020104030203" pitchFamily="2" charset="-79"/>
+              </a:rPr>
+              <a:t>Exemplificação de uso</a:t>
+            </a:r>
+          </a:p>
+        </p:txBody>
+      </p:sp>
+      <p:sp>
+        <p:nvSpPr>
+          <p:cNvPr id="3" name="Espaço Reservado para Texto 2">
+            <a:extLst>
+              <a:ext uri="{FF2B5EF4-FFF2-40B4-BE49-F238E27FC236}">
+                <a16:creationId xmlns:a16="http://schemas.microsoft.com/office/drawing/2014/main" id="{72908049-A6C0-4B7F-A845-BA297829D8A2}"/>
+              </a:ext>
+            </a:extLst>
+          </p:cNvPr>
+          <p:cNvSpPr>
+            <a:spLocks noGrp="1"/>
+          </p:cNvSpPr>
+          <p:nvPr>
+            <p:ph type="body" idx="1"/>
+          </p:nvPr>
+        </p:nvSpPr>
+        <p:spPr/>
+        <p:txBody>
+          <a:bodyPr/>
+          <a:lstStyle/>
+          <a:p>
+            <a:r>
+              <a:rPr lang="pt-BR" dirty="0">
+                <a:solidFill>
+                  <a:srgbClr val="003B4C"/>
+                </a:solidFill>
+                <a:latin typeface="Aharoni" panose="02010803020104030203" pitchFamily="2" charset="-79"/>
+                <a:cs typeface="Aharoni" panose="02010803020104030203" pitchFamily="2" charset="-79"/>
+              </a:rPr>
+              <a:t>Como o </a:t>
+            </a:r>
+            <a:r>
+              <a:rPr lang="pt-BR" dirty="0" err="1">
+                <a:solidFill>
+                  <a:srgbClr val="003B4C"/>
+                </a:solidFill>
+                <a:latin typeface="Aharoni" panose="02010803020104030203" pitchFamily="2" charset="-79"/>
+                <a:cs typeface="Aharoni" panose="02010803020104030203" pitchFamily="2" charset="-79"/>
+              </a:rPr>
+              <a:t>RoadTracker</a:t>
+            </a:r>
+            <a:r>
+              <a:rPr lang="pt-BR" dirty="0">
+                <a:solidFill>
+                  <a:srgbClr val="003B4C"/>
+                </a:solidFill>
+                <a:latin typeface="Aharoni" panose="02010803020104030203" pitchFamily="2" charset="-79"/>
+                <a:cs typeface="Aharoni" panose="02010803020104030203" pitchFamily="2" charset="-79"/>
+              </a:rPr>
+              <a:t> está até o momento</a:t>
+            </a:r>
+          </a:p>
+        </p:txBody>
+      </p:sp>
+    </p:spTree>
+    <p:extLst>
+      <p:ext uri="{BB962C8B-B14F-4D97-AF65-F5344CB8AC3E}">
+        <p14:creationId xmlns:p14="http://schemas.microsoft.com/office/powerpoint/2010/main" val="2166363564"/>
+      </p:ext>
+    </p:extLst>
+  </p:cSld>
+  <p:clrMapOvr>
+    <a:masterClrMapping/>
+  </p:clrMapOvr>
+</p:sld>
+</file>
+
+<file path=ppt/slides/slide17.xml><?xml version="1.0" encoding="utf-8"?>
+<p:sld xmlns:a="http://schemas.openxmlformats.org/drawingml/2006/main" xmlns:r="http://schemas.openxmlformats.org/officeDocument/2006/relationships" xmlns:p="http://schemas.openxmlformats.org/presentationml/2006/main">
+  <p:cSld>
+    <p:bg>
+      <p:bgPr>
+        <a:solidFill>
+          <a:srgbClr val="B1E0ED"/>
+        </a:solidFill>
+        <a:effectLst/>
+      </p:bgPr>
+    </p:bg>
+    <p:spTree>
+      <p:nvGrpSpPr>
+        <p:cNvPr id="1" name=""/>
+        <p:cNvGrpSpPr/>
+        <p:nvPr/>
+      </p:nvGrpSpPr>
+      <p:grpSpPr>
+        <a:xfrm>
+          <a:off x="0" y="0"/>
+          <a:ext cx="0" cy="0"/>
+          <a:chOff x="0" y="0"/>
+          <a:chExt cx="0" cy="0"/>
+        </a:xfrm>
+      </p:grpSpPr>
       <p:sp>
         <p:nvSpPr>
           <p:cNvPr id="2" name="Título 1">
@@ -3639,7 +4369,7 @@
 </p:sld>
 </file>
 
-<file path=ppt/slides/slide11.xml><?xml version="1.0" encoding="utf-8"?>
+<file path=ppt/slides/slide18.xml><?xml version="1.0" encoding="utf-8"?>
 <p:sld xmlns:a="http://schemas.openxmlformats.org/drawingml/2006/main" xmlns:r="http://schemas.openxmlformats.org/officeDocument/2006/relationships" xmlns:p="http://schemas.openxmlformats.org/presentationml/2006/main">
   <p:cSld>
     <p:bg>
@@ -4185,85 +4915,45 @@
           <a:chExt cx="0" cy="0"/>
         </a:xfrm>
       </p:grpSpPr>
-      <p:sp>
-        <p:nvSpPr>
-          <p:cNvPr id="2" name="Título 1">
-            <a:extLst>
-              <a:ext uri="{FF2B5EF4-FFF2-40B4-BE49-F238E27FC236}">
-                <a16:creationId xmlns:a16="http://schemas.microsoft.com/office/drawing/2014/main" id="{2DD7BC93-A7C1-4D1E-A4D7-13CA29EA4F30}"/>
-              </a:ext>
-            </a:extLst>
-          </p:cNvPr>
-          <p:cNvSpPr>
-            <a:spLocks noGrp="1"/>
-          </p:cNvSpPr>
-          <p:nvPr>
-            <p:ph type="title"/>
-          </p:nvPr>
-        </p:nvSpPr>
-        <p:spPr/>
-        <p:txBody>
-          <a:bodyPr/>
-          <a:lstStyle/>
-          <a:p>
-            <a:r>
-              <a:rPr lang="pt-BR" dirty="0" err="1">
-                <a:solidFill>
-                  <a:srgbClr val="003B4C"/>
-                </a:solidFill>
-                <a:latin typeface="Aharoni" panose="02010803020104030203" pitchFamily="2" charset="-79"/>
-                <a:cs typeface="Aharoni" panose="02010803020104030203" pitchFamily="2" charset="-79"/>
-              </a:rPr>
-              <a:t>RoadTracker</a:t>
-            </a:r>
-            <a:endParaRPr lang="pt-BR" dirty="0">
-              <a:solidFill>
-                <a:srgbClr val="003B4C"/>
-              </a:solidFill>
-              <a:latin typeface="Aharoni" panose="02010803020104030203" pitchFamily="2" charset="-79"/>
-              <a:cs typeface="Aharoni" panose="02010803020104030203" pitchFamily="2" charset="-79"/>
-            </a:endParaRPr>
-          </a:p>
-        </p:txBody>
-      </p:sp>
-      <p:sp>
-        <p:nvSpPr>
-          <p:cNvPr id="3" name="Espaço Reservado para Texto 2">
-            <a:extLst>
-              <a:ext uri="{FF2B5EF4-FFF2-40B4-BE49-F238E27FC236}">
-                <a16:creationId xmlns:a16="http://schemas.microsoft.com/office/drawing/2014/main" id="{72908049-A6C0-4B7F-A845-BA297829D8A2}"/>
-              </a:ext>
-            </a:extLst>
-          </p:cNvPr>
-          <p:cNvSpPr>
-            <a:spLocks noGrp="1"/>
-          </p:cNvSpPr>
-          <p:nvPr>
-            <p:ph type="body" idx="1"/>
-          </p:nvPr>
-        </p:nvSpPr>
-        <p:spPr/>
-        <p:txBody>
-          <a:bodyPr/>
-          <a:lstStyle/>
-          <a:p>
-            <a:r>
-              <a:rPr lang="pt-BR" dirty="0">
-                <a:solidFill>
-                  <a:srgbClr val="003B4C"/>
-                </a:solidFill>
-                <a:latin typeface="Aharoni" panose="02010803020104030203" pitchFamily="2" charset="-79"/>
-                <a:cs typeface="Aharoni" panose="02010803020104030203" pitchFamily="2" charset="-79"/>
-              </a:rPr>
-              <a:t>O nosso sistema</a:t>
-            </a:r>
-          </a:p>
-        </p:txBody>
-      </p:sp>
+      <p:pic>
+        <p:nvPicPr>
+          <p:cNvPr id="5" name="Imagem 4" descr="Uma imagem contendo Linha do tempo&#10;&#10;Descrição gerada automaticamente">
+            <a:extLst>
+              <a:ext uri="{FF2B5EF4-FFF2-40B4-BE49-F238E27FC236}">
+                <a16:creationId xmlns:a16="http://schemas.microsoft.com/office/drawing/2014/main" id="{247A67C5-A764-4433-AAC3-C18FDAB039EC}"/>
+              </a:ext>
+            </a:extLst>
+          </p:cNvPr>
+          <p:cNvPicPr>
+            <a:picLocks noChangeAspect="1"/>
+          </p:cNvPicPr>
+          <p:nvPr/>
+        </p:nvPicPr>
+        <p:blipFill rotWithShape="1">
+          <a:blip r:embed="rId2">
+            <a:extLst>
+              <a:ext uri="{28A0092B-C50C-407E-A947-70E740481C1C}">
+                <a14:useLocalDpi xmlns:a14="http://schemas.microsoft.com/office/drawing/2010/main" val="0"/>
+              </a:ext>
+            </a:extLst>
+          </a:blip>
+          <a:srcRect t="18551" b="2054"/>
+          <a:stretch/>
+        </p:blipFill>
+        <p:spPr>
+          <a:xfrm>
+            <a:off x="2396975" y="-3324"/>
+            <a:ext cx="7398050" cy="6861324"/>
+          </a:xfrm>
+          <a:prstGeom prst="rect">
+            <a:avLst/>
+          </a:prstGeom>
+        </p:spPr>
+      </p:pic>
     </p:spTree>
     <p:extLst>
       <p:ext uri="{BB962C8B-B14F-4D97-AF65-F5344CB8AC3E}">
-        <p14:creationId xmlns:p14="http://schemas.microsoft.com/office/powerpoint/2010/main" val="3245720063"/>
+        <p14:creationId xmlns:p14="http://schemas.microsoft.com/office/powerpoint/2010/main" val="3699946671"/>
       </p:ext>
     </p:extLst>
   </p:cSld>
@@ -4298,78 +4988,45 @@
           <a:chExt cx="0" cy="0"/>
         </a:xfrm>
       </p:grpSpPr>
-      <p:sp>
-        <p:nvSpPr>
-          <p:cNvPr id="2" name="Título 1">
-            <a:extLst>
-              <a:ext uri="{FF2B5EF4-FFF2-40B4-BE49-F238E27FC236}">
-                <a16:creationId xmlns:a16="http://schemas.microsoft.com/office/drawing/2014/main" id="{2DD7BC93-A7C1-4D1E-A4D7-13CA29EA4F30}"/>
-              </a:ext>
-            </a:extLst>
-          </p:cNvPr>
-          <p:cNvSpPr>
-            <a:spLocks noGrp="1"/>
-          </p:cNvSpPr>
-          <p:nvPr>
-            <p:ph type="title"/>
-          </p:nvPr>
-        </p:nvSpPr>
-        <p:spPr/>
-        <p:txBody>
-          <a:bodyPr/>
-          <a:lstStyle/>
-          <a:p>
-            <a:r>
-              <a:rPr lang="pt-BR" dirty="0">
-                <a:solidFill>
-                  <a:srgbClr val="003B4C"/>
-                </a:solidFill>
-                <a:latin typeface="Aharoni" panose="02010803020104030203" pitchFamily="2" charset="-79"/>
-                <a:cs typeface="Aharoni" panose="02010803020104030203" pitchFamily="2" charset="-79"/>
-              </a:rPr>
-              <a:t>Primeira entrega</a:t>
-            </a:r>
-          </a:p>
-        </p:txBody>
-      </p:sp>
-      <p:sp>
-        <p:nvSpPr>
-          <p:cNvPr id="3" name="Espaço Reservado para Texto 2">
-            <a:extLst>
-              <a:ext uri="{FF2B5EF4-FFF2-40B4-BE49-F238E27FC236}">
-                <a16:creationId xmlns:a16="http://schemas.microsoft.com/office/drawing/2014/main" id="{72908049-A6C0-4B7F-A845-BA297829D8A2}"/>
-              </a:ext>
-            </a:extLst>
-          </p:cNvPr>
-          <p:cNvSpPr>
-            <a:spLocks noGrp="1"/>
-          </p:cNvSpPr>
-          <p:nvPr>
-            <p:ph type="body" idx="1"/>
-          </p:nvPr>
-        </p:nvSpPr>
-        <p:spPr/>
-        <p:txBody>
-          <a:bodyPr/>
-          <a:lstStyle/>
-          <a:p>
-            <a:r>
-              <a:rPr lang="pt-BR" dirty="0">
-                <a:solidFill>
-                  <a:srgbClr val="003B4C"/>
-                </a:solidFill>
-                <a:latin typeface="Aharoni" panose="02010803020104030203" pitchFamily="2" charset="-79"/>
-                <a:cs typeface="Aharoni" panose="02010803020104030203" pitchFamily="2" charset="-79"/>
-              </a:rPr>
-              <a:t>O que iremos entregar</a:t>
-            </a:r>
-          </a:p>
-        </p:txBody>
-      </p:sp>
+      <p:pic>
+        <p:nvPicPr>
+          <p:cNvPr id="3" name="Imagem 2" descr="Diagrama&#10;&#10;Descrição gerada automaticamente">
+            <a:extLst>
+              <a:ext uri="{FF2B5EF4-FFF2-40B4-BE49-F238E27FC236}">
+                <a16:creationId xmlns:a16="http://schemas.microsoft.com/office/drawing/2014/main" id="{EF9EFE96-9AAA-4898-83E2-CBFB7560A12A}"/>
+              </a:ext>
+            </a:extLst>
+          </p:cNvPr>
+          <p:cNvPicPr>
+            <a:picLocks noChangeAspect="1"/>
+          </p:cNvPicPr>
+          <p:nvPr/>
+        </p:nvPicPr>
+        <p:blipFill rotWithShape="1">
+          <a:blip r:embed="rId2">
+            <a:extLst>
+              <a:ext uri="{28A0092B-C50C-407E-A947-70E740481C1C}">
+                <a14:useLocalDpi xmlns:a14="http://schemas.microsoft.com/office/drawing/2010/main" val="0"/>
+              </a:ext>
+            </a:extLst>
+          </a:blip>
+          <a:srcRect b="48406"/>
+          <a:stretch/>
+        </p:blipFill>
+        <p:spPr>
+          <a:xfrm>
+            <a:off x="1397846" y="0"/>
+            <a:ext cx="9396307" cy="6858000"/>
+          </a:xfrm>
+          <a:prstGeom prst="rect">
+            <a:avLst/>
+          </a:prstGeom>
+        </p:spPr>
+      </p:pic>
     </p:spTree>
     <p:extLst>
       <p:ext uri="{BB962C8B-B14F-4D97-AF65-F5344CB8AC3E}">
-        <p14:creationId xmlns:p14="http://schemas.microsoft.com/office/powerpoint/2010/main" val="806626883"/>
+        <p14:creationId xmlns:p14="http://schemas.microsoft.com/office/powerpoint/2010/main" val="3401513584"/>
       </p:ext>
     </p:extLst>
   </p:cSld>
@@ -4404,95 +5061,80 @@
           <a:chExt cx="0" cy="0"/>
         </a:xfrm>
       </p:grpSpPr>
-      <p:sp>
-        <p:nvSpPr>
-          <p:cNvPr id="2" name="Título 1">
-            <a:extLst>
-              <a:ext uri="{FF2B5EF4-FFF2-40B4-BE49-F238E27FC236}">
-                <a16:creationId xmlns:a16="http://schemas.microsoft.com/office/drawing/2014/main" id="{2DD7BC93-A7C1-4D1E-A4D7-13CA29EA4F30}"/>
-              </a:ext>
-            </a:extLst>
-          </p:cNvPr>
-          <p:cNvSpPr>
-            <a:spLocks noGrp="1"/>
-          </p:cNvSpPr>
-          <p:nvPr>
-            <p:ph type="title"/>
-          </p:nvPr>
-        </p:nvSpPr>
-        <p:spPr/>
-        <p:txBody>
-          <a:bodyPr/>
-          <a:lstStyle/>
-          <a:p>
-            <a:r>
-              <a:rPr lang="pt-BR" dirty="0">
-                <a:solidFill>
-                  <a:srgbClr val="003B4C"/>
-                </a:solidFill>
-                <a:latin typeface="Aharoni" panose="02010803020104030203" pitchFamily="2" charset="-79"/>
-                <a:cs typeface="Aharoni" panose="02010803020104030203" pitchFamily="2" charset="-79"/>
-              </a:rPr>
-              <a:t>Banco de dados</a:t>
-            </a:r>
-          </a:p>
-        </p:txBody>
-      </p:sp>
-      <p:sp>
-        <p:nvSpPr>
-          <p:cNvPr id="3" name="Espaço Reservado para Texto 2">
-            <a:extLst>
-              <a:ext uri="{FF2B5EF4-FFF2-40B4-BE49-F238E27FC236}">
-                <a16:creationId xmlns:a16="http://schemas.microsoft.com/office/drawing/2014/main" id="{72908049-A6C0-4B7F-A845-BA297829D8A2}"/>
-              </a:ext>
-            </a:extLst>
-          </p:cNvPr>
-          <p:cNvSpPr>
-            <a:spLocks noGrp="1"/>
-          </p:cNvSpPr>
-          <p:nvPr>
-            <p:ph type="body" idx="1"/>
-          </p:nvPr>
-        </p:nvSpPr>
-        <p:spPr/>
-        <p:txBody>
-          <a:bodyPr/>
-          <a:lstStyle/>
-          <a:p>
-            <a:r>
-              <a:rPr lang="pt-BR" dirty="0">
-                <a:solidFill>
-                  <a:srgbClr val="003B4C"/>
-                </a:solidFill>
-                <a:latin typeface="Aharoni" panose="02010803020104030203" pitchFamily="2" charset="-79"/>
-                <a:cs typeface="Aharoni" panose="02010803020104030203" pitchFamily="2" charset="-79"/>
-              </a:rPr>
-              <a:t>Disposição dos dados no </a:t>
-            </a:r>
-            <a:r>
-              <a:rPr lang="pt-BR" dirty="0" err="1">
-                <a:solidFill>
-                  <a:srgbClr val="003B4C"/>
-                </a:solidFill>
-                <a:latin typeface="Aharoni" panose="02010803020104030203" pitchFamily="2" charset="-79"/>
-                <a:cs typeface="Aharoni" panose="02010803020104030203" pitchFamily="2" charset="-79"/>
-              </a:rPr>
-              <a:t>RoadTracker</a:t>
-            </a:r>
-            <a:endParaRPr lang="pt-BR" dirty="0">
-              <a:solidFill>
-                <a:srgbClr val="003B4C"/>
-              </a:solidFill>
-              <a:latin typeface="Aharoni" panose="02010803020104030203" pitchFamily="2" charset="-79"/>
-              <a:cs typeface="Aharoni" panose="02010803020104030203" pitchFamily="2" charset="-79"/>
-            </a:endParaRPr>
-          </a:p>
-        </p:txBody>
-      </p:sp>
+      <p:pic>
+        <p:nvPicPr>
+          <p:cNvPr id="4" name="Imagem 3" descr="Diagrama&#10;&#10;Descrição gerada automaticamente">
+            <a:extLst>
+              <a:ext uri="{FF2B5EF4-FFF2-40B4-BE49-F238E27FC236}">
+                <a16:creationId xmlns:a16="http://schemas.microsoft.com/office/drawing/2014/main" id="{2707B5BD-0405-43DF-80B8-770FA9821749}"/>
+              </a:ext>
+            </a:extLst>
+          </p:cNvPr>
+          <p:cNvPicPr>
+            <a:picLocks noChangeAspect="1"/>
+          </p:cNvPicPr>
+          <p:nvPr/>
+        </p:nvPicPr>
+        <p:blipFill rotWithShape="1">
+          <a:blip r:embed="rId2">
+            <a:extLst>
+              <a:ext uri="{28A0092B-C50C-407E-A947-70E740481C1C}">
+                <a14:useLocalDpi xmlns:a14="http://schemas.microsoft.com/office/drawing/2010/main" val="0"/>
+              </a:ext>
+            </a:extLst>
+          </a:blip>
+          <a:srcRect t="52104" b="3996"/>
+          <a:stretch/>
+        </p:blipFill>
+        <p:spPr>
+          <a:xfrm>
+            <a:off x="2565417" y="0"/>
+            <a:ext cx="7061166" cy="4385206"/>
+          </a:xfrm>
+          <a:prstGeom prst="rect">
+            <a:avLst/>
+          </a:prstGeom>
+        </p:spPr>
+      </p:pic>
+      <p:pic>
+        <p:nvPicPr>
+          <p:cNvPr id="6" name="Imagem 5" descr="Uma imagem contendo Diagrama&#10;&#10;Descrição gerada automaticamente">
+            <a:extLst>
+              <a:ext uri="{FF2B5EF4-FFF2-40B4-BE49-F238E27FC236}">
+                <a16:creationId xmlns:a16="http://schemas.microsoft.com/office/drawing/2014/main" id="{9B0FE13D-8A68-43B3-8C0E-254A4127792F}"/>
+              </a:ext>
+            </a:extLst>
+          </p:cNvPr>
+          <p:cNvPicPr>
+            <a:picLocks noChangeAspect="1"/>
+          </p:cNvPicPr>
+          <p:nvPr/>
+        </p:nvPicPr>
+        <p:blipFill rotWithShape="1">
+          <a:blip r:embed="rId3">
+            <a:extLst>
+              <a:ext uri="{28A0092B-C50C-407E-A947-70E740481C1C}">
+                <a14:useLocalDpi xmlns:a14="http://schemas.microsoft.com/office/drawing/2010/main" val="0"/>
+              </a:ext>
+            </a:extLst>
+          </a:blip>
+          <a:srcRect r="1325"/>
+          <a:stretch/>
+        </p:blipFill>
+        <p:spPr>
+          <a:xfrm>
+            <a:off x="2565418" y="4385206"/>
+            <a:ext cx="7061166" cy="2472794"/>
+          </a:xfrm>
+          <a:prstGeom prst="rect">
+            <a:avLst/>
+          </a:prstGeom>
+        </p:spPr>
+      </p:pic>
     </p:spTree>
     <p:extLst>
       <p:ext uri="{BB962C8B-B14F-4D97-AF65-F5344CB8AC3E}">
-        <p14:creationId xmlns:p14="http://schemas.microsoft.com/office/powerpoint/2010/main" val="1127846638"/>
+        <p14:creationId xmlns:p14="http://schemas.microsoft.com/office/powerpoint/2010/main" val="9163014"/>
       </p:ext>
     </p:extLst>
   </p:cSld>
@@ -4527,98 +5169,45 @@
           <a:chExt cx="0" cy="0"/>
         </a:xfrm>
       </p:grpSpPr>
-      <p:sp>
-        <p:nvSpPr>
-          <p:cNvPr id="2" name="Título 1">
-            <a:extLst>
-              <a:ext uri="{FF2B5EF4-FFF2-40B4-BE49-F238E27FC236}">
-                <a16:creationId xmlns:a16="http://schemas.microsoft.com/office/drawing/2014/main" id="{2DD7BC93-A7C1-4D1E-A4D7-13CA29EA4F30}"/>
-              </a:ext>
-            </a:extLst>
-          </p:cNvPr>
-          <p:cNvSpPr>
-            <a:spLocks noGrp="1"/>
-          </p:cNvSpPr>
-          <p:nvPr>
-            <p:ph type="title"/>
-          </p:nvPr>
-        </p:nvSpPr>
-        <p:spPr/>
-        <p:txBody>
-          <a:bodyPr/>
-          <a:lstStyle/>
-          <a:p>
-            <a:r>
-              <a:rPr lang="pt-BR" dirty="0">
-                <a:solidFill>
-                  <a:srgbClr val="003B4C"/>
-                </a:solidFill>
-                <a:latin typeface="Aharoni" panose="02010803020104030203" pitchFamily="2" charset="-79"/>
-                <a:cs typeface="Aharoni" panose="02010803020104030203" pitchFamily="2" charset="-79"/>
-              </a:rPr>
-              <a:t>Exemplificação de uso</a:t>
-            </a:r>
-          </a:p>
-        </p:txBody>
-      </p:sp>
-      <p:sp>
-        <p:nvSpPr>
-          <p:cNvPr id="3" name="Espaço Reservado para Texto 2">
-            <a:extLst>
-              <a:ext uri="{FF2B5EF4-FFF2-40B4-BE49-F238E27FC236}">
-                <a16:creationId xmlns:a16="http://schemas.microsoft.com/office/drawing/2014/main" id="{72908049-A6C0-4B7F-A845-BA297829D8A2}"/>
-              </a:ext>
-            </a:extLst>
-          </p:cNvPr>
-          <p:cNvSpPr>
-            <a:spLocks noGrp="1"/>
-          </p:cNvSpPr>
-          <p:nvPr>
-            <p:ph type="body" idx="1"/>
-          </p:nvPr>
-        </p:nvSpPr>
-        <p:spPr/>
-        <p:txBody>
-          <a:bodyPr/>
-          <a:lstStyle/>
-          <a:p>
-            <a:r>
-              <a:rPr lang="pt-BR" dirty="0">
-                <a:solidFill>
-                  <a:srgbClr val="003B4C"/>
-                </a:solidFill>
-                <a:latin typeface="Aharoni" panose="02010803020104030203" pitchFamily="2" charset="-79"/>
-                <a:cs typeface="Aharoni" panose="02010803020104030203" pitchFamily="2" charset="-79"/>
-              </a:rPr>
-              <a:t>Como o </a:t>
-            </a:r>
-            <a:r>
-              <a:rPr lang="pt-BR" dirty="0" err="1">
-                <a:solidFill>
-                  <a:srgbClr val="003B4C"/>
-                </a:solidFill>
-                <a:latin typeface="Aharoni" panose="02010803020104030203" pitchFamily="2" charset="-79"/>
-                <a:cs typeface="Aharoni" panose="02010803020104030203" pitchFamily="2" charset="-79"/>
-              </a:rPr>
-              <a:t>RoadTracker</a:t>
-            </a:r>
-            <a:r>
-              <a:rPr lang="pt-BR" dirty="0">
-                <a:solidFill>
-                  <a:srgbClr val="003B4C"/>
-                </a:solidFill>
-                <a:latin typeface="Aharoni" panose="02010803020104030203" pitchFamily="2" charset="-79"/>
-                <a:cs typeface="Aharoni" panose="02010803020104030203" pitchFamily="2" charset="-79"/>
-              </a:rPr>
-              <a:t> está até o momento</a:t>
-            </a:r>
-          </a:p>
-        </p:txBody>
-      </p:sp>
+      <p:pic>
+        <p:nvPicPr>
+          <p:cNvPr id="3" name="Imagem 2" descr="Diagrama&#10;&#10;Descrição gerada automaticamente">
+            <a:extLst>
+              <a:ext uri="{FF2B5EF4-FFF2-40B4-BE49-F238E27FC236}">
+                <a16:creationId xmlns:a16="http://schemas.microsoft.com/office/drawing/2014/main" id="{D085FA65-F595-4C33-9F63-F35B3C451EE9}"/>
+              </a:ext>
+            </a:extLst>
+          </p:cNvPr>
+          <p:cNvPicPr>
+            <a:picLocks noChangeAspect="1"/>
+          </p:cNvPicPr>
+          <p:nvPr/>
+        </p:nvPicPr>
+        <p:blipFill rotWithShape="1">
+          <a:blip r:embed="rId2">
+            <a:extLst>
+              <a:ext uri="{28A0092B-C50C-407E-A947-70E740481C1C}">
+                <a14:useLocalDpi xmlns:a14="http://schemas.microsoft.com/office/drawing/2010/main" val="0"/>
+              </a:ext>
+            </a:extLst>
+          </a:blip>
+          <a:srcRect b="1643"/>
+          <a:stretch/>
+        </p:blipFill>
+        <p:spPr>
+          <a:xfrm>
+            <a:off x="2834926" y="0"/>
+            <a:ext cx="6522147" cy="6858001"/>
+          </a:xfrm>
+          <a:prstGeom prst="rect">
+            <a:avLst/>
+          </a:prstGeom>
+        </p:spPr>
+      </p:pic>
     </p:spTree>
     <p:extLst>
       <p:ext uri="{BB962C8B-B14F-4D97-AF65-F5344CB8AC3E}">
-        <p14:creationId xmlns:p14="http://schemas.microsoft.com/office/powerpoint/2010/main" val="2166363564"/>
+        <p14:creationId xmlns:p14="http://schemas.microsoft.com/office/powerpoint/2010/main" val="4133027167"/>
       </p:ext>
     </p:extLst>
   </p:cSld>

</xml_diff>